<commit_message>
updated doc n ppt
</commit_message>
<xml_diff>
--- a/PY MP PPT.pptx
+++ b/PY MP PPT.pptx
@@ -18,16 +18,18 @@
     <p:sldId id="262" r:id="rId13"/>
     <p:sldId id="263" r:id="rId14"/>
     <p:sldId id="264" r:id="rId15"/>
+    <p:sldId id="265" r:id="rId16"/>
+    <p:sldId id="266" r:id="rId17"/>
   </p:sldIdLst>
   <p:sldSz cy="5143500" cx="9144000"/>
   <p:notesSz cx="6858000" cy="9144000"/>
   <p:embeddedFontLst>
     <p:embeddedFont>
       <p:font typeface="Proxima Nova"/>
-      <p:regular r:id="rId16"/>
-      <p:bold r:id="rId17"/>
-      <p:italic r:id="rId18"/>
-      <p:boldItalic r:id="rId19"/>
+      <p:regular r:id="rId18"/>
+      <p:bold r:id="rId19"/>
+      <p:italic r:id="rId20"/>
+      <p:boldItalic r:id="rId21"/>
     </p:embeddedFont>
   </p:embeddedFontLst>
   <p:defaultTextStyle>
@@ -803,6 +805,204 @@
 </p:notes>
 </file>
 
+<file path=ppt/notesSlides/notesSlide10.xml><?xml version="1.0" encoding="utf-8"?>
+<p:notes xmlns:a="http://schemas.openxmlformats.org/drawingml/2006/main" xmlns:r="http://schemas.openxmlformats.org/officeDocument/2006/relationships" xmlns:mc="http://schemas.openxmlformats.org/markup-compatibility/2006" xmlns:mv="urn:schemas-microsoft-com:mac:vml" xmlns:p="http://schemas.openxmlformats.org/presentationml/2006/main" xmlns:c="http://schemas.openxmlformats.org/drawingml/2006/chart" xmlns:dgm="http://schemas.openxmlformats.org/drawingml/2006/diagram" xmlns:o="urn:schemas-microsoft-com:office:office" xmlns:v="urn:schemas-microsoft-com:vml" xmlns:pvml="urn:schemas-microsoft-com:office:powerpoint" xmlns:com="http://schemas.openxmlformats.org/drawingml/2006/compatibility" xmlns:p14="http://schemas.microsoft.com/office/powerpoint/2010/main" xmlns:p15="http://schemas.microsoft.com/office/powerpoint/2012/main" xmlns:ahyp="http://schemas.microsoft.com/office/drawing/2018/hyperlinkcolor" showMasterPhAnim="0" showMasterSp="0">
+  <p:cSld>
+    <p:spTree>
+      <p:nvGrpSpPr>
+        <p:cNvPr id="160" name="Shape 160"/>
+        <p:cNvGrpSpPr/>
+        <p:nvPr/>
+      </p:nvGrpSpPr>
+      <p:grpSpPr>
+        <a:xfrm>
+          <a:off x="0" y="0"/>
+          <a:ext cx="0" cy="0"/>
+          <a:chOff x="0" y="0"/>
+          <a:chExt cx="0" cy="0"/>
+        </a:xfrm>
+      </p:grpSpPr>
+      <p:sp>
+        <p:nvSpPr>
+          <p:cNvPr id="161" name="Google Shape;161;gd55bcc4e3f_0_8:notes"/>
+          <p:cNvSpPr/>
+          <p:nvPr>
+            <p:ph idx="2" type="sldImg"/>
+          </p:nvPr>
+        </p:nvSpPr>
+        <p:spPr>
+          <a:xfrm>
+            <a:off x="381300" y="685800"/>
+            <a:ext cx="6096000" cy="3429000"/>
+          </a:xfrm>
+          <a:custGeom>
+            <a:rect b="b" l="l" r="r" t="t"/>
+            <a:pathLst>
+              <a:path extrusionOk="0" h="120000" w="120000">
+                <a:moveTo>
+                  <a:pt x="0" y="0"/>
+                </a:moveTo>
+                <a:lnTo>
+                  <a:pt x="120000" y="0"/>
+                </a:lnTo>
+                <a:lnTo>
+                  <a:pt x="120000" y="120000"/>
+                </a:lnTo>
+                <a:lnTo>
+                  <a:pt x="0" y="120000"/>
+                </a:lnTo>
+                <a:close/>
+              </a:path>
+            </a:pathLst>
+          </a:custGeom>
+        </p:spPr>
+      </p:sp>
+      <p:sp>
+        <p:nvSpPr>
+          <p:cNvPr id="162" name="Google Shape;162;gd55bcc4e3f_0_8:notes"/>
+          <p:cNvSpPr txBox="1"/>
+          <p:nvPr>
+            <p:ph idx="1" type="body"/>
+          </p:nvPr>
+        </p:nvSpPr>
+        <p:spPr>
+          <a:xfrm>
+            <a:off x="685800" y="4343400"/>
+            <a:ext cx="5486400" cy="4114800"/>
+          </a:xfrm>
+          <a:prstGeom prst="rect">
+            <a:avLst/>
+          </a:prstGeom>
+        </p:spPr>
+        <p:txBody>
+          <a:bodyPr anchorCtr="0" anchor="t" bIns="91425" lIns="91425" spcFirstLastPara="1" rIns="91425" wrap="square" tIns="91425">
+            <a:noAutofit/>
+          </a:bodyPr>
+          <a:lstStyle/>
+          <a:p>
+            <a:pPr indent="0" lvl="0" marL="0" rtl="0" algn="l">
+              <a:spcBef>
+                <a:spcPts val="0"/>
+              </a:spcBef>
+              <a:spcAft>
+                <a:spcPts val="0"/>
+              </a:spcAft>
+              <a:buNone/>
+            </a:pPr>
+            <a:r>
+              <a:t/>
+            </a:r>
+            <a:endParaRPr/>
+          </a:p>
+        </p:txBody>
+      </p:sp>
+    </p:spTree>
+  </p:cSld>
+  <p:clrMapOvr>
+    <a:masterClrMapping/>
+  </p:clrMapOvr>
+</p:notes>
+</file>
+
+<file path=ppt/notesSlides/notesSlide11.xml><?xml version="1.0" encoding="utf-8"?>
+<p:notes xmlns:a="http://schemas.openxmlformats.org/drawingml/2006/main" xmlns:r="http://schemas.openxmlformats.org/officeDocument/2006/relationships" xmlns:mc="http://schemas.openxmlformats.org/markup-compatibility/2006" xmlns:mv="urn:schemas-microsoft-com:mac:vml" xmlns:p="http://schemas.openxmlformats.org/presentationml/2006/main" xmlns:c="http://schemas.openxmlformats.org/drawingml/2006/chart" xmlns:dgm="http://schemas.openxmlformats.org/drawingml/2006/diagram" xmlns:o="urn:schemas-microsoft-com:office:office" xmlns:v="urn:schemas-microsoft-com:vml" xmlns:pvml="urn:schemas-microsoft-com:office:powerpoint" xmlns:com="http://schemas.openxmlformats.org/drawingml/2006/compatibility" xmlns:p14="http://schemas.microsoft.com/office/powerpoint/2010/main" xmlns:p15="http://schemas.microsoft.com/office/powerpoint/2012/main" xmlns:ahyp="http://schemas.microsoft.com/office/drawing/2018/hyperlinkcolor" showMasterPhAnim="0" showMasterSp="0">
+  <p:cSld>
+    <p:spTree>
+      <p:nvGrpSpPr>
+        <p:cNvPr id="166" name="Shape 166"/>
+        <p:cNvGrpSpPr/>
+        <p:nvPr/>
+      </p:nvGrpSpPr>
+      <p:grpSpPr>
+        <a:xfrm>
+          <a:off x="0" y="0"/>
+          <a:ext cx="0" cy="0"/>
+          <a:chOff x="0" y="0"/>
+          <a:chExt cx="0" cy="0"/>
+        </a:xfrm>
+      </p:grpSpPr>
+      <p:sp>
+        <p:nvSpPr>
+          <p:cNvPr id="167" name="Google Shape;167;gcd727c3f37_0_0:notes"/>
+          <p:cNvSpPr/>
+          <p:nvPr>
+            <p:ph idx="2" type="sldImg"/>
+          </p:nvPr>
+        </p:nvSpPr>
+        <p:spPr>
+          <a:xfrm>
+            <a:off x="381300" y="685800"/>
+            <a:ext cx="6096000" cy="3429000"/>
+          </a:xfrm>
+          <a:custGeom>
+            <a:rect b="b" l="l" r="r" t="t"/>
+            <a:pathLst>
+              <a:path extrusionOk="0" h="120000" w="120000">
+                <a:moveTo>
+                  <a:pt x="0" y="0"/>
+                </a:moveTo>
+                <a:lnTo>
+                  <a:pt x="120000" y="0"/>
+                </a:lnTo>
+                <a:lnTo>
+                  <a:pt x="120000" y="120000"/>
+                </a:lnTo>
+                <a:lnTo>
+                  <a:pt x="0" y="120000"/>
+                </a:lnTo>
+                <a:close/>
+              </a:path>
+            </a:pathLst>
+          </a:custGeom>
+        </p:spPr>
+      </p:sp>
+      <p:sp>
+        <p:nvSpPr>
+          <p:cNvPr id="168" name="Google Shape;168;gcd727c3f37_0_0:notes"/>
+          <p:cNvSpPr txBox="1"/>
+          <p:nvPr>
+            <p:ph idx="1" type="body"/>
+          </p:nvPr>
+        </p:nvSpPr>
+        <p:spPr>
+          <a:xfrm>
+            <a:off x="685800" y="4343400"/>
+            <a:ext cx="5486400" cy="4114800"/>
+          </a:xfrm>
+          <a:prstGeom prst="rect">
+            <a:avLst/>
+          </a:prstGeom>
+        </p:spPr>
+        <p:txBody>
+          <a:bodyPr anchorCtr="0" anchor="t" bIns="91425" lIns="91425" spcFirstLastPara="1" rIns="91425" wrap="square" tIns="91425">
+            <a:noAutofit/>
+          </a:bodyPr>
+          <a:lstStyle/>
+          <a:p>
+            <a:pPr indent="0" lvl="0" marL="0" rtl="0" algn="l">
+              <a:spcBef>
+                <a:spcPts val="0"/>
+              </a:spcBef>
+              <a:spcAft>
+                <a:spcPts val="0"/>
+              </a:spcAft>
+              <a:buNone/>
+            </a:pPr>
+            <a:r>
+              <a:t/>
+            </a:r>
+            <a:endParaRPr/>
+          </a:p>
+        </p:txBody>
+      </p:sp>
+    </p:spTree>
+  </p:cSld>
+  <p:clrMapOvr>
+    <a:masterClrMapping/>
+  </p:clrMapOvr>
+</p:notes>
+</file>
+
 <file path=ppt/notesSlides/notesSlide2.xml><?xml version="1.0" encoding="utf-8"?>
 <p:notes xmlns:a="http://schemas.openxmlformats.org/drawingml/2006/main" xmlns:r="http://schemas.openxmlformats.org/officeDocument/2006/relationships" xmlns:mc="http://schemas.openxmlformats.org/markup-compatibility/2006" xmlns:mv="urn:schemas-microsoft-com:mac:vml" xmlns:p="http://schemas.openxmlformats.org/presentationml/2006/main" xmlns:c="http://schemas.openxmlformats.org/drawingml/2006/chart" xmlns:dgm="http://schemas.openxmlformats.org/drawingml/2006/diagram" xmlns:o="urn:schemas-microsoft-com:office:office" xmlns:v="urn:schemas-microsoft-com:vml" xmlns:pvml="urn:schemas-microsoft-com:office:powerpoint" xmlns:com="http://schemas.openxmlformats.org/drawingml/2006/compatibility" xmlns:p14="http://schemas.microsoft.com/office/powerpoint/2010/main" xmlns:p15="http://schemas.microsoft.com/office/powerpoint/2012/main" xmlns:ahyp="http://schemas.microsoft.com/office/drawing/2018/hyperlinkcolor" showMasterPhAnim="0" showMasterSp="0">
   <p:cSld>
@@ -1515,7 +1715,7 @@
       </p:grpSpPr>
       <p:sp>
         <p:nvSpPr>
-          <p:cNvPr id="155" name="Google Shape;155;gcd727c3f37_0_0:notes"/>
+          <p:cNvPr id="155" name="Google Shape;155;gd6a167d66c_0_11:notes"/>
           <p:cNvSpPr/>
           <p:nvPr>
             <p:ph idx="2" type="sldImg"/>
@@ -1550,7 +1750,7 @@
       </p:sp>
       <p:sp>
         <p:nvSpPr>
-          <p:cNvPr id="156" name="Google Shape;156;gcd727c3f37_0_0:notes"/>
+          <p:cNvPr id="156" name="Google Shape;156;gd6a167d66c_0_11:notes"/>
           <p:cNvSpPr txBox="1"/>
           <p:nvPr>
             <p:ph idx="1" type="body"/>
@@ -11692,10 +11892,6 @@
               <a:rPr lang="en" sz="2400"/>
               <a:t>y</a:t>
             </a:r>
-            <a:r>
-              <a:rPr b="1" lang="en"/>
-              <a:t> </a:t>
-            </a:r>
             <a:endParaRPr b="1"/>
           </a:p>
           <a:p>
@@ -11806,6 +12002,284 @@
           </a:ln>
         </p:spPr>
       </p:cxnSp>
+    </p:spTree>
+  </p:cSld>
+  <p:clrMapOvr>
+    <a:masterClrMapping/>
+  </p:clrMapOvr>
+</p:sld>
+</file>
+
+<file path=ppt/slides/slide10.xml><?xml version="1.0" encoding="utf-8"?>
+<p:sld xmlns:a="http://schemas.openxmlformats.org/drawingml/2006/main" xmlns:r="http://schemas.openxmlformats.org/officeDocument/2006/relationships" xmlns:mc="http://schemas.openxmlformats.org/markup-compatibility/2006" xmlns:mv="urn:schemas-microsoft-com:mac:vml" xmlns:p="http://schemas.openxmlformats.org/presentationml/2006/main" xmlns:c="http://schemas.openxmlformats.org/drawingml/2006/chart" xmlns:dgm="http://schemas.openxmlformats.org/drawingml/2006/diagram" xmlns:o="urn:schemas-microsoft-com:office:office" xmlns:v="urn:schemas-microsoft-com:vml" xmlns:pvml="urn:schemas-microsoft-com:office:powerpoint" xmlns:com="http://schemas.openxmlformats.org/drawingml/2006/compatibility" xmlns:p14="http://schemas.microsoft.com/office/powerpoint/2010/main" xmlns:p15="http://schemas.microsoft.com/office/powerpoint/2012/main" xmlns:ahyp="http://schemas.microsoft.com/office/drawing/2018/hyperlinkcolor">
+  <p:cSld>
+    <p:spTree>
+      <p:nvGrpSpPr>
+        <p:cNvPr id="163" name="Shape 163"/>
+        <p:cNvGrpSpPr/>
+        <p:nvPr/>
+      </p:nvGrpSpPr>
+      <p:grpSpPr>
+        <a:xfrm>
+          <a:off x="0" y="0"/>
+          <a:ext cx="0" cy="0"/>
+          <a:chOff x="0" y="0"/>
+          <a:chExt cx="0" cy="0"/>
+        </a:xfrm>
+      </p:grpSpPr>
+      <p:sp>
+        <p:nvSpPr>
+          <p:cNvPr id="164" name="Google Shape;164;p34"/>
+          <p:cNvSpPr txBox="1"/>
+          <p:nvPr>
+            <p:ph type="title"/>
+          </p:nvPr>
+        </p:nvSpPr>
+        <p:spPr>
+          <a:xfrm>
+            <a:off x="311700" y="445025"/>
+            <a:ext cx="8520600" cy="572700"/>
+          </a:xfrm>
+          <a:prstGeom prst="rect">
+            <a:avLst/>
+          </a:prstGeom>
+        </p:spPr>
+        <p:txBody>
+          <a:bodyPr anchorCtr="0" anchor="t" bIns="91425" lIns="91425" spcFirstLastPara="1" rIns="91425" wrap="square" tIns="91425">
+            <a:noAutofit/>
+          </a:bodyPr>
+          <a:lstStyle/>
+          <a:p>
+            <a:pPr indent="0" lvl="0" marL="0" rtl="0" algn="l">
+              <a:spcBef>
+                <a:spcPts val="0"/>
+              </a:spcBef>
+              <a:spcAft>
+                <a:spcPts val="0"/>
+              </a:spcAft>
+              <a:buNone/>
+            </a:pPr>
+            <a:r>
+              <a:rPr lang="en" sz="3600"/>
+              <a:t>CONCLUSION</a:t>
+            </a:r>
+            <a:endParaRPr sz="3600"/>
+          </a:p>
+        </p:txBody>
+      </p:sp>
+      <p:sp>
+        <p:nvSpPr>
+          <p:cNvPr id="165" name="Google Shape;165;p34"/>
+          <p:cNvSpPr txBox="1"/>
+          <p:nvPr>
+            <p:ph idx="1" type="body"/>
+          </p:nvPr>
+        </p:nvSpPr>
+        <p:spPr>
+          <a:xfrm>
+            <a:off x="311700" y="1396375"/>
+            <a:ext cx="8520600" cy="3172500"/>
+          </a:xfrm>
+          <a:prstGeom prst="rect">
+            <a:avLst/>
+          </a:prstGeom>
+        </p:spPr>
+        <p:txBody>
+          <a:bodyPr anchorCtr="0" anchor="t" bIns="91425" lIns="91425" spcFirstLastPara="1" rIns="91425" wrap="square" tIns="91425">
+            <a:noAutofit/>
+          </a:bodyPr>
+          <a:lstStyle/>
+          <a:p>
+            <a:pPr indent="0" lvl="0" marL="0" rtl="0" algn="l">
+              <a:spcBef>
+                <a:spcPts val="0"/>
+              </a:spcBef>
+              <a:spcAft>
+                <a:spcPts val="0"/>
+              </a:spcAft>
+              <a:buNone/>
+            </a:pPr>
+            <a:r>
+              <a:rPr lang="en" sz="2400"/>
+              <a:t>The project helps us understand python tkinter module thoroughly and various queries of database. The project clears the concept of how CRUD operations can be done using python and sqlite3</a:t>
+            </a:r>
+            <a:endParaRPr sz="2400"/>
+          </a:p>
+          <a:p>
+            <a:pPr indent="0" lvl="0" marL="0" rtl="0" algn="l">
+              <a:spcBef>
+                <a:spcPts val="1600"/>
+              </a:spcBef>
+              <a:spcAft>
+                <a:spcPts val="1600"/>
+              </a:spcAft>
+              <a:buNone/>
+            </a:pPr>
+            <a:r>
+              <a:rPr lang="en" sz="2400"/>
+              <a:t>Apart from that we also have a working password manager system to store passwords for different applications and retrieve it when necessary. </a:t>
+            </a:r>
+            <a:endParaRPr sz="2400"/>
+          </a:p>
+        </p:txBody>
+      </p:sp>
+    </p:spTree>
+  </p:cSld>
+  <p:clrMapOvr>
+    <a:masterClrMapping/>
+  </p:clrMapOvr>
+</p:sld>
+</file>
+
+<file path=ppt/slides/slide11.xml><?xml version="1.0" encoding="utf-8"?>
+<p:sld xmlns:a="http://schemas.openxmlformats.org/drawingml/2006/main" xmlns:r="http://schemas.openxmlformats.org/officeDocument/2006/relationships" xmlns:mc="http://schemas.openxmlformats.org/markup-compatibility/2006" xmlns:mv="urn:schemas-microsoft-com:mac:vml" xmlns:p="http://schemas.openxmlformats.org/presentationml/2006/main" xmlns:c="http://schemas.openxmlformats.org/drawingml/2006/chart" xmlns:dgm="http://schemas.openxmlformats.org/drawingml/2006/diagram" xmlns:o="urn:schemas-microsoft-com:office:office" xmlns:v="urn:schemas-microsoft-com:vml" xmlns:pvml="urn:schemas-microsoft-com:office:powerpoint" xmlns:com="http://schemas.openxmlformats.org/drawingml/2006/compatibility" xmlns:p14="http://schemas.microsoft.com/office/powerpoint/2010/main" xmlns:p15="http://schemas.microsoft.com/office/powerpoint/2012/main" xmlns:ahyp="http://schemas.microsoft.com/office/drawing/2018/hyperlinkcolor">
+  <p:cSld>
+    <p:bg>
+      <p:bgPr>
+        <a:solidFill>
+          <a:schemeClr val="lt2"/>
+        </a:solidFill>
+      </p:bgPr>
+    </p:bg>
+    <p:spTree>
+      <p:nvGrpSpPr>
+        <p:cNvPr id="169" name="Shape 169"/>
+        <p:cNvGrpSpPr/>
+        <p:nvPr/>
+      </p:nvGrpSpPr>
+      <p:grpSpPr>
+        <a:xfrm>
+          <a:off x="0" y="0"/>
+          <a:ext cx="0" cy="0"/>
+          <a:chOff x="0" y="0"/>
+          <a:chExt cx="0" cy="0"/>
+        </a:xfrm>
+      </p:grpSpPr>
+      <p:sp>
+        <p:nvSpPr>
+          <p:cNvPr id="170" name="Google Shape;170;p35"/>
+          <p:cNvSpPr txBox="1"/>
+          <p:nvPr/>
+        </p:nvSpPr>
+        <p:spPr>
+          <a:xfrm>
+            <a:off x="1225650" y="618400"/>
+            <a:ext cx="6692700" cy="3786600"/>
+          </a:xfrm>
+          <a:prstGeom prst="rect">
+            <a:avLst/>
+          </a:prstGeom>
+          <a:noFill/>
+          <a:ln>
+            <a:noFill/>
+          </a:ln>
+        </p:spPr>
+        <p:txBody>
+          <a:bodyPr anchorCtr="0" anchor="t" bIns="91425" lIns="91425" spcFirstLastPara="1" rIns="91425" wrap="square" tIns="91425">
+            <a:spAutoFit/>
+          </a:bodyPr>
+          <a:lstStyle/>
+          <a:p>
+            <a:pPr indent="0" lvl="0" marL="0" rtl="0" algn="ctr">
+              <a:spcBef>
+                <a:spcPts val="0"/>
+              </a:spcBef>
+              <a:spcAft>
+                <a:spcPts val="0"/>
+              </a:spcAft>
+              <a:buNone/>
+            </a:pPr>
+            <a:r>
+              <a:rPr lang="en" sz="6900">
+                <a:solidFill>
+                  <a:srgbClr val="FFFFFF"/>
+                </a:solidFill>
+                <a:latin typeface="Proxima Nova"/>
+                <a:ea typeface="Proxima Nova"/>
+                <a:cs typeface="Proxima Nova"/>
+                <a:sym typeface="Proxima Nova"/>
+              </a:rPr>
+              <a:t>Thank You ! </a:t>
+            </a:r>
+            <a:endParaRPr sz="6900">
+              <a:solidFill>
+                <a:srgbClr val="FFFFFF"/>
+              </a:solidFill>
+              <a:latin typeface="Proxima Nova"/>
+              <a:ea typeface="Proxima Nova"/>
+              <a:cs typeface="Proxima Nova"/>
+              <a:sym typeface="Proxima Nova"/>
+            </a:endParaRPr>
+          </a:p>
+          <a:p>
+            <a:pPr indent="0" lvl="0" marL="0" rtl="0" algn="ctr">
+              <a:spcBef>
+                <a:spcPts val="0"/>
+              </a:spcBef>
+              <a:spcAft>
+                <a:spcPts val="0"/>
+              </a:spcAft>
+              <a:buNone/>
+            </a:pPr>
+            <a:r>
+              <a:rPr lang="en" sz="9600">
+                <a:solidFill>
+                  <a:srgbClr val="FFFFFF"/>
+                </a:solidFill>
+                <a:latin typeface="Proxima Nova"/>
+                <a:ea typeface="Proxima Nova"/>
+                <a:cs typeface="Proxima Nova"/>
+                <a:sym typeface="Proxima Nova"/>
+              </a:rPr>
+              <a:t>☺</a:t>
+            </a:r>
+            <a:r>
+              <a:rPr lang="en" sz="6900">
+                <a:solidFill>
+                  <a:srgbClr val="FFFFFF"/>
+                </a:solidFill>
+                <a:latin typeface="Proxima Nova"/>
+                <a:ea typeface="Proxima Nova"/>
+                <a:cs typeface="Proxima Nova"/>
+                <a:sym typeface="Proxima Nova"/>
+              </a:rPr>
+              <a:t> </a:t>
+            </a:r>
+            <a:endParaRPr sz="6900">
+              <a:solidFill>
+                <a:srgbClr val="FFFFFF"/>
+              </a:solidFill>
+              <a:latin typeface="Proxima Nova"/>
+              <a:ea typeface="Proxima Nova"/>
+              <a:cs typeface="Proxima Nova"/>
+              <a:sym typeface="Proxima Nova"/>
+            </a:endParaRPr>
+          </a:p>
+          <a:p>
+            <a:pPr indent="0" lvl="0" marL="0" rtl="0" algn="ctr">
+              <a:spcBef>
+                <a:spcPts val="0"/>
+              </a:spcBef>
+              <a:spcAft>
+                <a:spcPts val="0"/>
+              </a:spcAft>
+              <a:buNone/>
+            </a:pPr>
+            <a:r>
+              <a:t/>
+            </a:r>
+            <a:endParaRPr sz="6900">
+              <a:solidFill>
+                <a:srgbClr val="FFFFFF"/>
+              </a:solidFill>
+              <a:latin typeface="Proxima Nova"/>
+              <a:ea typeface="Proxima Nova"/>
+              <a:cs typeface="Proxima Nova"/>
+              <a:sym typeface="Proxima Nova"/>
+            </a:endParaRPr>
+          </a:p>
+        </p:txBody>
+      </p:sp>
     </p:spTree>
   </p:cSld>
   <p:clrMapOvr>
@@ -12554,8 +13028,8 @@
         </p:nvSpPr>
         <p:spPr>
           <a:xfrm>
-            <a:off x="311700" y="445025"/>
-            <a:ext cx="8520600" cy="572700"/>
+            <a:off x="130500" y="445025"/>
+            <a:ext cx="8883000" cy="572700"/>
           </a:xfrm>
           <a:prstGeom prst="rect">
             <a:avLst/>
@@ -12578,7 +13052,7 @@
             </a:pPr>
             <a:r>
               <a:rPr lang="en" sz="3600"/>
-              <a:t>FLOW DIAGRAM</a:t>
+              <a:t>FLOW DIAGRAM (COMPONENT DIAGRAM)</a:t>
             </a:r>
             <a:endParaRPr sz="3600"/>
           </a:p>
@@ -12600,8 +13074,8 @@
         </p:blipFill>
         <p:spPr>
           <a:xfrm>
-            <a:off x="130513" y="1355525"/>
-            <a:ext cx="8882975" cy="2432450"/>
+            <a:off x="130525" y="1355525"/>
+            <a:ext cx="8882975" cy="2796450"/>
           </a:xfrm>
           <a:prstGeom prst="rect">
             <a:avLst/>
@@ -12871,7 +13345,7 @@
         <p:spPr>
           <a:xfrm>
             <a:off x="311700" y="445025"/>
-            <a:ext cx="8520600" cy="572700"/>
+            <a:ext cx="8661600" cy="572700"/>
           </a:xfrm>
           <a:prstGeom prst="rect">
             <a:avLst/>
@@ -12893,10 +13367,10 @@
               <a:buNone/>
             </a:pPr>
             <a:r>
-              <a:rPr lang="en" sz="3600"/>
-              <a:t>CONCLUSION</a:t>
+              <a:rPr lang="en" sz="3900"/>
+              <a:t>Difficulty Faced &amp; how We overcame it</a:t>
             </a:r>
-            <a:endParaRPr sz="3600"/>
+            <a:endParaRPr sz="3900"/>
           </a:p>
         </p:txBody>
       </p:sp>
@@ -12910,8 +13384,8 @@
         </p:nvSpPr>
         <p:spPr>
           <a:xfrm>
-            <a:off x="311700" y="1396375"/>
-            <a:ext cx="8520600" cy="3172500"/>
+            <a:off x="311700" y="1598825"/>
+            <a:ext cx="8520600" cy="2970000"/>
           </a:xfrm>
           <a:prstGeom prst="rect">
             <a:avLst/>
@@ -12928,39 +13402,15 @@
                 <a:spcPts val="0"/>
               </a:spcBef>
               <a:spcAft>
-                <a:spcPts val="0"/>
+                <a:spcPts val="1600"/>
               </a:spcAft>
               <a:buNone/>
             </a:pPr>
             <a:r>
-              <a:rPr lang="en" sz="2400"/>
-              <a:t>The project helps us understand python tkinter </a:t>
+              <a:rPr lang="en" sz="2700"/>
+              <a:t>The major difficulty faced by us was to create a table and enable selecting of rows inside it to allow users to edit the values that they have previously set. In order to achieve this, we used a TreeView which is available in tkinter.</a:t>
             </a:r>
-            <a:r>
-              <a:rPr lang="en" sz="2400"/>
-              <a:t>module</a:t>
-            </a:r>
-            <a:r>
-              <a:rPr lang="en" sz="2400"/>
-              <a:t> thoroughly and various queries of database. The project clears the concept of how CRUD operations can be done using python and sqlite3</a:t>
-            </a:r>
-            <a:endParaRPr sz="2400"/>
-          </a:p>
-          <a:p>
-            <a:pPr indent="0" lvl="0" marL="0" rtl="0" algn="l">
-              <a:spcBef>
-                <a:spcPts val="1600"/>
-              </a:spcBef>
-              <a:spcAft>
-                <a:spcPts val="1600"/>
-              </a:spcAft>
-              <a:buNone/>
-            </a:pPr>
-            <a:r>
-              <a:rPr lang="en" sz="2400"/>
-              <a:t>Apart from that we also have a working password manager system to store passwords for different applications and retrieve it when necessary. </a:t>
-            </a:r>
-            <a:endParaRPr sz="2400"/>
+            <a:endParaRPr sz="2700"/>
           </a:p>
         </p:txBody>
       </p:sp>
@@ -12975,13 +13425,6 @@
 <file path=ppt/slides/slide9.xml><?xml version="1.0" encoding="utf-8"?>
 <p:sld xmlns:a="http://schemas.openxmlformats.org/drawingml/2006/main" xmlns:r="http://schemas.openxmlformats.org/officeDocument/2006/relationships" xmlns:mc="http://schemas.openxmlformats.org/markup-compatibility/2006" xmlns:mv="urn:schemas-microsoft-com:mac:vml" xmlns:p="http://schemas.openxmlformats.org/presentationml/2006/main" xmlns:c="http://schemas.openxmlformats.org/drawingml/2006/chart" xmlns:dgm="http://schemas.openxmlformats.org/drawingml/2006/diagram" xmlns:o="urn:schemas-microsoft-com:office:office" xmlns:v="urn:schemas-microsoft-com:vml" xmlns:pvml="urn:schemas-microsoft-com:office:powerpoint" xmlns:com="http://schemas.openxmlformats.org/drawingml/2006/compatibility" xmlns:p14="http://schemas.microsoft.com/office/powerpoint/2010/main" xmlns:p15="http://schemas.microsoft.com/office/powerpoint/2012/main" xmlns:ahyp="http://schemas.microsoft.com/office/drawing/2018/hyperlinkcolor">
   <p:cSld>
-    <p:bg>
-      <p:bgPr>
-        <a:solidFill>
-          <a:schemeClr val="lt2"/>
-        </a:solidFill>
-      </p:bgPr>
-    </p:bg>
     <p:spTree>
       <p:nvGrpSpPr>
         <p:cNvPr id="157" name="Shape 157"/>
@@ -13000,28 +13443,26 @@
         <p:nvSpPr>
           <p:cNvPr id="158" name="Google Shape;158;p33"/>
           <p:cNvSpPr txBox="1"/>
-          <p:nvPr/>
+          <p:nvPr>
+            <p:ph type="title"/>
+          </p:nvPr>
         </p:nvSpPr>
         <p:spPr>
           <a:xfrm>
-            <a:off x="1225650" y="618400"/>
-            <a:ext cx="6692700" cy="3786600"/>
+            <a:off x="311700" y="445025"/>
+            <a:ext cx="8520600" cy="572700"/>
           </a:xfrm>
           <a:prstGeom prst="rect">
             <a:avLst/>
           </a:prstGeom>
-          <a:noFill/>
-          <a:ln>
-            <a:noFill/>
-          </a:ln>
         </p:spPr>
         <p:txBody>
           <a:bodyPr anchorCtr="0" anchor="t" bIns="91425" lIns="91425" spcFirstLastPara="1" rIns="91425" wrap="square" tIns="91425">
-            <a:spAutoFit/>
+            <a:noAutofit/>
           </a:bodyPr>
           <a:lstStyle/>
           <a:p>
-            <a:pPr indent="0" lvl="0" marL="0" rtl="0" algn="ctr">
+            <a:pPr indent="0" lvl="0" marL="0" rtl="0" algn="l">
               <a:spcBef>
                 <a:spcPts val="0"/>
               </a:spcBef>
@@ -13031,93 +13472,66 @@
               <a:buNone/>
             </a:pPr>
             <a:r>
-              <a:rPr lang="en" sz="6900">
-                <a:solidFill>
-                  <a:srgbClr val="FFFFFF"/>
-                </a:solidFill>
-                <a:latin typeface="Proxima Nova"/>
-                <a:ea typeface="Proxima Nova"/>
-                <a:cs typeface="Proxima Nova"/>
-                <a:sym typeface="Proxima Nova"/>
-              </a:rPr>
-              <a:t>Thank You </a:t>
+              <a:rPr lang="en" sz="3900"/>
+              <a:t>Team Work</a:t>
             </a:r>
-            <a:endParaRPr sz="6900">
-              <a:solidFill>
-                <a:srgbClr val="FFFFFF"/>
-              </a:solidFill>
-              <a:latin typeface="Proxima Nova"/>
-              <a:ea typeface="Proxima Nova"/>
-              <a:cs typeface="Proxima Nova"/>
-              <a:sym typeface="Proxima Nova"/>
-            </a:endParaRPr>
+            <a:endParaRPr sz="3900"/>
+          </a:p>
+        </p:txBody>
+      </p:sp>
+      <p:sp>
+        <p:nvSpPr>
+          <p:cNvPr id="159" name="Google Shape;159;p33"/>
+          <p:cNvSpPr txBox="1"/>
+          <p:nvPr>
+            <p:ph idx="1" type="body"/>
+          </p:nvPr>
+        </p:nvSpPr>
+        <p:spPr>
+          <a:xfrm>
+            <a:off x="311700" y="1598825"/>
+            <a:ext cx="8520600" cy="2970000"/>
+          </a:xfrm>
+          <a:prstGeom prst="rect">
+            <a:avLst/>
+          </a:prstGeom>
+        </p:spPr>
+        <p:txBody>
+          <a:bodyPr anchorCtr="0" anchor="t" bIns="91425" lIns="91425" spcFirstLastPara="1" rIns="91425" wrap="square" tIns="91425">
+            <a:noAutofit/>
+          </a:bodyPr>
+          <a:lstStyle/>
+          <a:p>
+            <a:pPr indent="0" lvl="0" marL="0" rtl="0" algn="l">
+              <a:spcBef>
+                <a:spcPts val="0"/>
+              </a:spcBef>
+              <a:spcAft>
+                <a:spcPts val="0"/>
+              </a:spcAft>
+              <a:buNone/>
+            </a:pPr>
+            <a:r>
+              <a:rPr lang="en" sz="2700"/>
+              <a:t>Nidhi - Front &amp; Back End (Main Page, Create new, Update)</a:t>
+            </a:r>
+            <a:endParaRPr sz="2700"/>
           </a:p>
           <a:p>
-            <a:pPr indent="0" lvl="0" marL="0" rtl="0" algn="ctr">
-              <a:spcBef>
-                <a:spcPts val="0"/>
-              </a:spcBef>
-              <a:spcAft>
-                <a:spcPts val="0"/>
+            <a:pPr indent="0" lvl="0" marL="0" rtl="0" algn="l">
+              <a:spcBef>
+                <a:spcPts val="1600"/>
+              </a:spcBef>
+              <a:spcAft>
+                <a:spcPts val="1600"/>
               </a:spcAft>
               <a:buNone/>
             </a:pPr>
             <a:r>
-              <a:rPr lang="en" sz="9600">
-                <a:solidFill>
-                  <a:srgbClr val="FFFFFF"/>
-                </a:solidFill>
-                <a:latin typeface="Proxima Nova"/>
-                <a:ea typeface="Proxima Nova"/>
-                <a:cs typeface="Proxima Nova"/>
-                <a:sym typeface="Proxima Nova"/>
-              </a:rPr>
-              <a:t>☺</a:t>
+              <a:rPr lang="en" sz="2700"/>
+              <a:t>Kashish - Front &amp; Back End (Login, Register, Delete)</a:t>
             </a:r>
-            <a:r>
-              <a:rPr lang="en" sz="6900">
-                <a:solidFill>
-                  <a:srgbClr val="FFFFFF"/>
-                </a:solidFill>
-                <a:latin typeface="Proxima Nova"/>
-                <a:ea typeface="Proxima Nova"/>
-                <a:cs typeface="Proxima Nova"/>
-                <a:sym typeface="Proxima Nova"/>
-              </a:rPr>
-              <a:t> </a:t>
-            </a:r>
-            <a:endParaRPr sz="6900">
-              <a:solidFill>
-                <a:srgbClr val="FFFFFF"/>
-              </a:solidFill>
-              <a:latin typeface="Proxima Nova"/>
-              <a:ea typeface="Proxima Nova"/>
-              <a:cs typeface="Proxima Nova"/>
-              <a:sym typeface="Proxima Nova"/>
-            </a:endParaRPr>
-          </a:p>
-          <a:p>
-            <a:pPr indent="0" lvl="0" marL="0" rtl="0" algn="ctr">
-              <a:spcBef>
-                <a:spcPts val="0"/>
-              </a:spcBef>
-              <a:spcAft>
-                <a:spcPts val="0"/>
-              </a:spcAft>
-              <a:buNone/>
-            </a:pPr>
-            <a:r>
-              <a:t/>
-            </a:r>
-            <a:endParaRPr sz="6900">
-              <a:solidFill>
-                <a:srgbClr val="FFFFFF"/>
-              </a:solidFill>
-              <a:latin typeface="Proxima Nova"/>
-              <a:ea typeface="Proxima Nova"/>
-              <a:cs typeface="Proxima Nova"/>
-              <a:sym typeface="Proxima Nova"/>
-            </a:endParaRPr>
+            <a:endParaRPr sz="2700"/>
           </a:p>
         </p:txBody>
       </p:sp>
@@ -13130,9 +13544,9 @@
 </file>
 
 <file path=ppt/theme/theme1.xml><?xml version="1.0" encoding="utf-8"?>
-<a:theme xmlns:a="http://schemas.openxmlformats.org/drawingml/2006/main" xmlns:r="http://schemas.openxmlformats.org/officeDocument/2006/relationships">
+<a:theme xmlns:a="http://schemas.openxmlformats.org/drawingml/2006/main" xmlns:r="http://schemas.openxmlformats.org/officeDocument/2006/relationships" name="Simple Light">
   <a:themeElements>
-    <a:clrScheme name="Default">
+    <a:clrScheme name="Simple Light">
       <a:dk1>
         <a:srgbClr val="000000"/>
       </a:dk1>
@@ -13140,34 +13554,34 @@
         <a:srgbClr val="FFFFFF"/>
       </a:lt1>
       <a:dk2>
-        <a:srgbClr val="158158"/>
+        <a:srgbClr val="595959"/>
       </a:dk2>
       <a:lt2>
-        <a:srgbClr val="F3F3F3"/>
+        <a:srgbClr val="EEEEEE"/>
       </a:lt2>
       <a:accent1>
-        <a:srgbClr val="058DC7"/>
+        <a:srgbClr val="FFAB40"/>
       </a:accent1>
       <a:accent2>
-        <a:srgbClr val="50B432"/>
+        <a:srgbClr val="212121"/>
       </a:accent2>
       <a:accent3>
-        <a:srgbClr val="ED561B"/>
+        <a:srgbClr val="78909C"/>
       </a:accent3>
       <a:accent4>
-        <a:srgbClr val="EDEF00"/>
+        <a:srgbClr val="FFAB40"/>
       </a:accent4>
       <a:accent5>
-        <a:srgbClr val="24CBE5"/>
+        <a:srgbClr val="0097A7"/>
       </a:accent5>
       <a:accent6>
-        <a:srgbClr val="64E572"/>
+        <a:srgbClr val="EEFF41"/>
       </a:accent6>
       <a:hlink>
-        <a:srgbClr val="2200CC"/>
+        <a:srgbClr val="0097A7"/>
       </a:hlink>
       <a:folHlink>
-        <a:srgbClr val="551A8B"/>
+        <a:srgbClr val="0097A7"/>
       </a:folHlink>
     </a:clrScheme>
     <a:fontScheme name="Office">
@@ -13409,9 +13823,9 @@
 </file>
 
 <file path=ppt/theme/theme2.xml><?xml version="1.0" encoding="utf-8"?>
-<a:theme xmlns:a="http://schemas.openxmlformats.org/drawingml/2006/main" xmlns:r="http://schemas.openxmlformats.org/officeDocument/2006/relationships" name="Simple Light">
+<a:theme xmlns:a="http://schemas.openxmlformats.org/drawingml/2006/main" xmlns:r="http://schemas.openxmlformats.org/officeDocument/2006/relationships">
   <a:themeElements>
-    <a:clrScheme name="Simple Light">
+    <a:clrScheme name="Default">
       <a:dk1>
         <a:srgbClr val="000000"/>
       </a:dk1>
@@ -13419,34 +13833,34 @@
         <a:srgbClr val="FFFFFF"/>
       </a:lt1>
       <a:dk2>
-        <a:srgbClr val="595959"/>
+        <a:srgbClr val="158158"/>
       </a:dk2>
       <a:lt2>
-        <a:srgbClr val="EEEEEE"/>
+        <a:srgbClr val="F3F3F3"/>
       </a:lt2>
       <a:accent1>
-        <a:srgbClr val="FFAB40"/>
+        <a:srgbClr val="058DC7"/>
       </a:accent1>
       <a:accent2>
-        <a:srgbClr val="212121"/>
+        <a:srgbClr val="50B432"/>
       </a:accent2>
       <a:accent3>
-        <a:srgbClr val="78909C"/>
+        <a:srgbClr val="ED561B"/>
       </a:accent3>
       <a:accent4>
-        <a:srgbClr val="FFAB40"/>
+        <a:srgbClr val="EDEF00"/>
       </a:accent4>
       <a:accent5>
-        <a:srgbClr val="0097A7"/>
+        <a:srgbClr val="24CBE5"/>
       </a:accent5>
       <a:accent6>
-        <a:srgbClr val="EEFF41"/>
+        <a:srgbClr val="64E572"/>
       </a:accent6>
       <a:hlink>
-        <a:srgbClr val="0097A7"/>
+        <a:srgbClr val="2200CC"/>
       </a:hlink>
       <a:folHlink>
-        <a:srgbClr val="0097A7"/>
+        <a:srgbClr val="551A8B"/>
       </a:folHlink>
     </a:clrScheme>
     <a:fontScheme name="Office">

</xml_diff>